<commit_message>
Image credit updates. Added pre-build .pdb files for SOIL and glfw to prevent build warnings.
</commit_message>
<xml_diff>
--- a/ImageCredits.pptx
+++ b/ImageCredits.pptx
@@ -5,16 +5,17 @@
     <p:sldMasterId id="2147483728" r:id="rId1"/>
   </p:sldMasterIdLst>
   <p:notesMasterIdLst>
-    <p:notesMasterId r:id="rId6"/>
+    <p:notesMasterId r:id="rId7"/>
   </p:notesMasterIdLst>
   <p:handoutMasterIdLst>
-    <p:handoutMasterId r:id="rId7"/>
+    <p:handoutMasterId r:id="rId8"/>
   </p:handoutMasterIdLst>
   <p:sldIdLst>
     <p:sldId id="257" r:id="rId2"/>
     <p:sldId id="271" r:id="rId3"/>
     <p:sldId id="272" r:id="rId4"/>
     <p:sldId id="273" r:id="rId5"/>
+    <p:sldId id="274" r:id="rId6"/>
   </p:sldIdLst>
   <p:sldSz cx="9144000" cy="5143500" type="screen16x9"/>
   <p:notesSz cx="6858000" cy="9144000"/>
@@ -145,7 +146,7 @@
   </p:defaultTextStyle>
   <p:extLst>
     <p:ext uri="{EFAFB233-063F-42B5-8137-9DF3F51BA10A}">
-      <p15:sldGuideLst xmlns:p15="http://schemas.microsoft.com/office/powerpoint/2012/main">
+      <p15:sldGuideLst xmlns:p15="http://schemas.microsoft.com/office/powerpoint/2012/main" xmlns="">
         <p15:guide id="1" orient="horz" pos="1620">
           <p15:clr>
             <a:srgbClr val="A4A3A4"/>
@@ -159,7 +160,7 @@
       </p15:sldGuideLst>
     </p:ext>
     <p:ext uri="{2D200454-40CA-4A62-9FC3-DE9A4176ACB9}">
-      <p15:notesGuideLst xmlns:p15="http://schemas.microsoft.com/office/powerpoint/2012/main"/>
+      <p15:notesGuideLst xmlns:p15="http://schemas.microsoft.com/office/powerpoint/2012/main" xmlns=""/>
     </p:ext>
   </p:extLst>
 </p:presentation>
@@ -215,14 +216,14 @@
           <a:effectLst/>
           <a:extLst>
             <a:ext uri="{909E8E84-426E-40DD-AFC4-6F175D3DCCD1}">
-              <a14:hiddenFill xmlns:a14="http://schemas.microsoft.com/office/drawing/2010/main">
+              <a14:hiddenFill xmlns:a14="http://schemas.microsoft.com/office/drawing/2010/main" xmlns="">
                 <a:solidFill>
                   <a:schemeClr val="accent1"/>
                 </a:solidFill>
               </a14:hiddenFill>
             </a:ext>
             <a:ext uri="{91240B29-F687-4F45-9708-019B960494DF}">
-              <a14:hiddenLine xmlns:a14="http://schemas.microsoft.com/office/drawing/2010/main" w="9525">
+              <a14:hiddenLine xmlns:a14="http://schemas.microsoft.com/office/drawing/2010/main" xmlns="" w="9525">
                 <a:solidFill>
                   <a:schemeClr val="tx1"/>
                 </a:solidFill>
@@ -232,7 +233,7 @@
               </a14:hiddenLine>
             </a:ext>
             <a:ext uri="{AF507438-7753-43E0-B8FC-AC1667EBCBE1}">
-              <a14:hiddenEffects xmlns:a14="http://schemas.microsoft.com/office/drawing/2010/main">
+              <a14:hiddenEffects xmlns:a14="http://schemas.microsoft.com/office/drawing/2010/main" xmlns="">
                 <a:effectLst>
                   <a:outerShdw blurRad="63500" dist="38099" dir="2700000" algn="ctr" rotWithShape="0">
                     <a:schemeClr val="bg2">
@@ -243,7 +244,7 @@
               </a14:hiddenEffects>
             </a:ext>
             <a:ext uri="{FAA26D3D-D897-4be2-8F04-BA451C77F1D7}">
-              <ma14:placeholderFlag xmlns:ma14="http://schemas.microsoft.com/office/mac/drawingml/2011/main" xmlns="" val="1"/>
+              <ma14:placeholderFlag xmlns="" xmlns:ma14="http://schemas.microsoft.com/office/mac/drawingml/2011/main" val="1"/>
             </a:ext>
           </a:extLst>
         </p:spPr>
@@ -294,14 +295,14 @@
           <a:effectLst/>
           <a:extLst>
             <a:ext uri="{909E8E84-426E-40DD-AFC4-6F175D3DCCD1}">
-              <a14:hiddenFill xmlns:a14="http://schemas.microsoft.com/office/drawing/2010/main">
+              <a14:hiddenFill xmlns:a14="http://schemas.microsoft.com/office/drawing/2010/main" xmlns="">
                 <a:solidFill>
                   <a:schemeClr val="accent1"/>
                 </a:solidFill>
               </a14:hiddenFill>
             </a:ext>
             <a:ext uri="{91240B29-F687-4F45-9708-019B960494DF}">
-              <a14:hiddenLine xmlns:a14="http://schemas.microsoft.com/office/drawing/2010/main" w="9525">
+              <a14:hiddenLine xmlns:a14="http://schemas.microsoft.com/office/drawing/2010/main" xmlns="" w="9525">
                 <a:solidFill>
                   <a:schemeClr val="tx1"/>
                 </a:solidFill>
@@ -311,7 +312,7 @@
               </a14:hiddenLine>
             </a:ext>
             <a:ext uri="{AF507438-7753-43E0-B8FC-AC1667EBCBE1}">
-              <a14:hiddenEffects xmlns:a14="http://schemas.microsoft.com/office/drawing/2010/main">
+              <a14:hiddenEffects xmlns:a14="http://schemas.microsoft.com/office/drawing/2010/main" xmlns="">
                 <a:effectLst>
                   <a:outerShdw blurRad="63500" dist="38099" dir="2700000" algn="ctr" rotWithShape="0">
                     <a:schemeClr val="bg2">
@@ -322,7 +323,7 @@
               </a14:hiddenEffects>
             </a:ext>
             <a:ext uri="{FAA26D3D-D897-4be2-8F04-BA451C77F1D7}">
-              <ma14:placeholderFlag xmlns:ma14="http://schemas.microsoft.com/office/mac/drawingml/2011/main" xmlns="" val="1"/>
+              <ma14:placeholderFlag xmlns="" xmlns:ma14="http://schemas.microsoft.com/office/mac/drawingml/2011/main" val="1"/>
             </a:ext>
           </a:extLst>
         </p:spPr>
@@ -349,7 +350,7 @@
               <a:pPr>
                 <a:defRPr/>
               </a:pPr>
-              <a:t>1/27/2014</a:t>
+              <a:t>5/3/2014</a:t>
             </a:fld>
             <a:endParaRPr lang="en-US"/>
           </a:p>
@@ -380,14 +381,14 @@
           <a:effectLst/>
           <a:extLst>
             <a:ext uri="{909E8E84-426E-40DD-AFC4-6F175D3DCCD1}">
-              <a14:hiddenFill xmlns:a14="http://schemas.microsoft.com/office/drawing/2010/main">
+              <a14:hiddenFill xmlns:a14="http://schemas.microsoft.com/office/drawing/2010/main" xmlns="">
                 <a:solidFill>
                   <a:schemeClr val="accent1"/>
                 </a:solidFill>
               </a14:hiddenFill>
             </a:ext>
             <a:ext uri="{91240B29-F687-4F45-9708-019B960494DF}">
-              <a14:hiddenLine xmlns:a14="http://schemas.microsoft.com/office/drawing/2010/main" w="9525">
+              <a14:hiddenLine xmlns:a14="http://schemas.microsoft.com/office/drawing/2010/main" xmlns="" w="9525">
                 <a:solidFill>
                   <a:schemeClr val="tx1"/>
                 </a:solidFill>
@@ -397,7 +398,7 @@
               </a14:hiddenLine>
             </a:ext>
             <a:ext uri="{AF507438-7753-43E0-B8FC-AC1667EBCBE1}">
-              <a14:hiddenEffects xmlns:a14="http://schemas.microsoft.com/office/drawing/2010/main">
+              <a14:hiddenEffects xmlns:a14="http://schemas.microsoft.com/office/drawing/2010/main" xmlns="">
                 <a:effectLst>
                   <a:outerShdw blurRad="63500" dist="38099" dir="2700000" algn="ctr" rotWithShape="0">
                     <a:schemeClr val="bg2">
@@ -408,7 +409,7 @@
               </a14:hiddenEffects>
             </a:ext>
             <a:ext uri="{FAA26D3D-D897-4be2-8F04-BA451C77F1D7}">
-              <ma14:placeholderFlag xmlns:ma14="http://schemas.microsoft.com/office/mac/drawingml/2011/main" xmlns="" val="1"/>
+              <ma14:placeholderFlag xmlns="" xmlns:ma14="http://schemas.microsoft.com/office/mac/drawingml/2011/main" val="1"/>
             </a:ext>
           </a:extLst>
         </p:spPr>
@@ -459,14 +460,14 @@
           <a:effectLst/>
           <a:extLst>
             <a:ext uri="{909E8E84-426E-40DD-AFC4-6F175D3DCCD1}">
-              <a14:hiddenFill xmlns:a14="http://schemas.microsoft.com/office/drawing/2010/main">
+              <a14:hiddenFill xmlns:a14="http://schemas.microsoft.com/office/drawing/2010/main" xmlns="">
                 <a:solidFill>
                   <a:schemeClr val="accent1"/>
                 </a:solidFill>
               </a14:hiddenFill>
             </a:ext>
             <a:ext uri="{91240B29-F687-4F45-9708-019B960494DF}">
-              <a14:hiddenLine xmlns:a14="http://schemas.microsoft.com/office/drawing/2010/main" w="9525">
+              <a14:hiddenLine xmlns:a14="http://schemas.microsoft.com/office/drawing/2010/main" xmlns="" w="9525">
                 <a:solidFill>
                   <a:schemeClr val="tx1"/>
                 </a:solidFill>
@@ -476,7 +477,7 @@
               </a14:hiddenLine>
             </a:ext>
             <a:ext uri="{AF507438-7753-43E0-B8FC-AC1667EBCBE1}">
-              <a14:hiddenEffects xmlns:a14="http://schemas.microsoft.com/office/drawing/2010/main">
+              <a14:hiddenEffects xmlns:a14="http://schemas.microsoft.com/office/drawing/2010/main" xmlns="">
                 <a:effectLst>
                   <a:outerShdw blurRad="63500" dist="38099" dir="2700000" algn="ctr" rotWithShape="0">
                     <a:schemeClr val="bg2">
@@ -487,7 +488,7 @@
               </a14:hiddenEffects>
             </a:ext>
             <a:ext uri="{FAA26D3D-D897-4be2-8F04-BA451C77F1D7}">
-              <ma14:placeholderFlag xmlns:ma14="http://schemas.microsoft.com/office/mac/drawingml/2011/main" xmlns="" val="1"/>
+              <ma14:placeholderFlag xmlns="" xmlns:ma14="http://schemas.microsoft.com/office/mac/drawingml/2011/main" val="1"/>
             </a:ext>
           </a:extLst>
         </p:spPr>
@@ -523,7 +524,7 @@
     </p:spTree>
     <p:extLst>
       <p:ext uri="{BB962C8B-B14F-4D97-AF65-F5344CB8AC3E}">
-        <p14:creationId xmlns:p14="http://schemas.microsoft.com/office/powerpoint/2010/main" val="664234569"/>
+        <p14:creationId xmlns:p14="http://schemas.microsoft.com/office/powerpoint/2010/main" xmlns="" val="664234569"/>
       </p:ext>
     </p:extLst>
   </p:cSld>
@@ -639,7 +640,7 @@
               <a:pPr>
                 <a:defRPr/>
               </a:pPr>
-              <a:t>1/27/2014</a:t>
+              <a:t>5/3/2014</a:t>
             </a:fld>
             <a:endParaRPr lang="en-US"/>
           </a:p>
@@ -836,7 +837,7 @@
     </p:spTree>
     <p:extLst>
       <p:ext uri="{BB962C8B-B14F-4D97-AF65-F5344CB8AC3E}">
-        <p14:creationId xmlns:p14="http://schemas.microsoft.com/office/powerpoint/2010/main" val="1823653009"/>
+        <p14:creationId xmlns:p14="http://schemas.microsoft.com/office/powerpoint/2010/main" xmlns="" val="1823653009"/>
       </p:ext>
     </p:extLst>
   </p:cSld>
@@ -1009,14 +1010,14 @@
           </a:ln>
           <a:extLst>
             <a:ext uri="{909E8E84-426E-40DD-AFC4-6F175D3DCCD1}">
-              <a14:hiddenFill xmlns:a14="http://schemas.microsoft.com/office/drawing/2010/main">
+              <a14:hiddenFill xmlns:a14="http://schemas.microsoft.com/office/drawing/2010/main" xmlns="">
                 <a:solidFill>
                   <a:srgbClr val="FFFFFF"/>
                 </a:solidFill>
               </a14:hiddenFill>
             </a:ext>
             <a:ext uri="{FAA26D3D-D897-4be2-8F04-BA451C77F1D7}">
-              <ma14:placeholderFlag xmlns:ma14="http://schemas.microsoft.com/office/mac/drawingml/2011/main" xmlns="" val="1"/>
+              <ma14:placeholderFlag xmlns="" xmlns:ma14="http://schemas.microsoft.com/office/mac/drawingml/2011/main" val="1"/>
             </a:ext>
           </a:extLst>
         </p:spPr>
@@ -1035,14 +1036,14 @@
           <a:noFill/>
           <a:extLst>
             <a:ext uri="{909E8E84-426E-40DD-AFC4-6F175D3DCCD1}">
-              <a14:hiddenFill xmlns:a14="http://schemas.microsoft.com/office/drawing/2010/main">
+              <a14:hiddenFill xmlns:a14="http://schemas.microsoft.com/office/drawing/2010/main" xmlns="">
                 <a:solidFill>
                   <a:srgbClr val="FFFFFF"/>
                 </a:solidFill>
               </a14:hiddenFill>
             </a:ext>
             <a:ext uri="{91240B29-F687-4F45-9708-019B960494DF}">
-              <a14:hiddenLine xmlns:a14="http://schemas.microsoft.com/office/drawing/2010/main" w="9525">
+              <a14:hiddenLine xmlns:a14="http://schemas.microsoft.com/office/drawing/2010/main" xmlns="" w="9525">
                 <a:solidFill>
                   <a:srgbClr val="000000"/>
                 </a:solidFill>
@@ -1052,7 +1053,7 @@
               </a14:hiddenLine>
             </a:ext>
             <a:ext uri="{FAA26D3D-D897-4be2-8F04-BA451C77F1D7}">
-              <ma14:placeholderFlag xmlns:ma14="http://schemas.microsoft.com/office/mac/drawingml/2011/main" xmlns="" val="1"/>
+              <ma14:placeholderFlag xmlns="" xmlns:ma14="http://schemas.microsoft.com/office/mac/drawingml/2011/main" val="1"/>
             </a:ext>
           </a:extLst>
         </p:spPr>
@@ -1127,14 +1128,14 @@
           <a:noFill/>
           <a:extLst>
             <a:ext uri="{909E8E84-426E-40DD-AFC4-6F175D3DCCD1}">
-              <a14:hiddenFill xmlns:a14="http://schemas.microsoft.com/office/drawing/2010/main">
+              <a14:hiddenFill xmlns:a14="http://schemas.microsoft.com/office/drawing/2010/main" xmlns="">
                 <a:solidFill>
                   <a:srgbClr val="FFFFFF"/>
                 </a:solidFill>
               </a14:hiddenFill>
             </a:ext>
             <a:ext uri="{91240B29-F687-4F45-9708-019B960494DF}">
-              <a14:hiddenLine xmlns:a14="http://schemas.microsoft.com/office/drawing/2010/main" w="9525">
+              <a14:hiddenLine xmlns:a14="http://schemas.microsoft.com/office/drawing/2010/main" xmlns="" w="9525">
                 <a:solidFill>
                   <a:srgbClr val="000000"/>
                 </a:solidFill>
@@ -1273,7 +1274,7 @@
     </p:spTree>
     <p:extLst>
       <p:ext uri="{BB962C8B-B14F-4D97-AF65-F5344CB8AC3E}">
-        <p14:creationId xmlns:p14="http://schemas.microsoft.com/office/powerpoint/2010/main" val="1034345267"/>
+        <p14:creationId xmlns:p14="http://schemas.microsoft.com/office/powerpoint/2010/main" xmlns="" val="1034345267"/>
       </p:ext>
     </p:extLst>
   </p:cSld>
@@ -1326,14 +1327,14 @@
           </a:ln>
           <a:extLst>
             <a:ext uri="{909E8E84-426E-40DD-AFC4-6F175D3DCCD1}">
-              <a14:hiddenFill xmlns:a14="http://schemas.microsoft.com/office/drawing/2010/main">
+              <a14:hiddenFill xmlns:a14="http://schemas.microsoft.com/office/drawing/2010/main" xmlns="">
                 <a:solidFill>
                   <a:srgbClr val="FFFFFF"/>
                 </a:solidFill>
               </a14:hiddenFill>
             </a:ext>
             <a:ext uri="{FAA26D3D-D897-4be2-8F04-BA451C77F1D7}">
-              <ma14:placeholderFlag xmlns="" xmlns:ma14="http://schemas.microsoft.com/office/mac/drawingml/2011/main" val="1"/>
+              <ma14:placeholderFlag xmlns:ma14="http://schemas.microsoft.com/office/mac/drawingml/2011/main" xmlns="" val="1"/>
             </a:ext>
           </a:extLst>
         </p:spPr>
@@ -1352,14 +1353,14 @@
           <a:noFill/>
           <a:extLst>
             <a:ext uri="{909E8E84-426E-40DD-AFC4-6F175D3DCCD1}">
-              <a14:hiddenFill xmlns:a14="http://schemas.microsoft.com/office/drawing/2010/main">
+              <a14:hiddenFill xmlns:a14="http://schemas.microsoft.com/office/drawing/2010/main" xmlns="">
                 <a:solidFill>
                   <a:srgbClr val="FFFFFF"/>
                 </a:solidFill>
               </a14:hiddenFill>
             </a:ext>
             <a:ext uri="{91240B29-F687-4F45-9708-019B960494DF}">
-              <a14:hiddenLine xmlns:a14="http://schemas.microsoft.com/office/drawing/2010/main" w="9525">
+              <a14:hiddenLine xmlns:a14="http://schemas.microsoft.com/office/drawing/2010/main" xmlns="" w="9525">
                 <a:solidFill>
                   <a:srgbClr val="000000"/>
                 </a:solidFill>
@@ -1369,7 +1370,7 @@
               </a14:hiddenLine>
             </a:ext>
             <a:ext uri="{FAA26D3D-D897-4be2-8F04-BA451C77F1D7}">
-              <ma14:placeholderFlag xmlns="" xmlns:ma14="http://schemas.microsoft.com/office/mac/drawingml/2011/main" val="1"/>
+              <ma14:placeholderFlag xmlns:ma14="http://schemas.microsoft.com/office/mac/drawingml/2011/main" xmlns="" val="1"/>
             </a:ext>
           </a:extLst>
         </p:spPr>
@@ -1437,14 +1438,14 @@
           <a:noFill/>
           <a:extLst>
             <a:ext uri="{909E8E84-426E-40DD-AFC4-6F175D3DCCD1}">
-              <a14:hiddenFill xmlns:a14="http://schemas.microsoft.com/office/drawing/2010/main">
+              <a14:hiddenFill xmlns:a14="http://schemas.microsoft.com/office/drawing/2010/main" xmlns="">
                 <a:solidFill>
                   <a:srgbClr val="FFFFFF"/>
                 </a:solidFill>
               </a14:hiddenFill>
             </a:ext>
             <a:ext uri="{91240B29-F687-4F45-9708-019B960494DF}">
-              <a14:hiddenLine xmlns:a14="http://schemas.microsoft.com/office/drawing/2010/main" w="9525">
+              <a14:hiddenLine xmlns:a14="http://schemas.microsoft.com/office/drawing/2010/main" xmlns="" w="9525">
                 <a:solidFill>
                   <a:srgbClr val="000000"/>
                 </a:solidFill>
@@ -1583,7 +1584,7 @@
     </p:spTree>
     <p:extLst>
       <p:ext uri="{BB962C8B-B14F-4D97-AF65-F5344CB8AC3E}">
-        <p14:creationId xmlns:p14="http://schemas.microsoft.com/office/powerpoint/2010/main" val="3172985269"/>
+        <p14:creationId xmlns:p14="http://schemas.microsoft.com/office/powerpoint/2010/main" xmlns="" val="3172985269"/>
       </p:ext>
     </p:extLst>
   </p:cSld>
@@ -1636,14 +1637,14 @@
           </a:ln>
           <a:extLst>
             <a:ext uri="{909E8E84-426E-40DD-AFC4-6F175D3DCCD1}">
-              <a14:hiddenFill xmlns:a14="http://schemas.microsoft.com/office/drawing/2010/main">
+              <a14:hiddenFill xmlns:a14="http://schemas.microsoft.com/office/drawing/2010/main" xmlns="">
                 <a:solidFill>
                   <a:srgbClr val="FFFFFF"/>
                 </a:solidFill>
               </a14:hiddenFill>
             </a:ext>
             <a:ext uri="{FAA26D3D-D897-4be2-8F04-BA451C77F1D7}">
-              <ma14:placeholderFlag xmlns="" xmlns:ma14="http://schemas.microsoft.com/office/mac/drawingml/2011/main" val="1"/>
+              <ma14:placeholderFlag xmlns:ma14="http://schemas.microsoft.com/office/mac/drawingml/2011/main" xmlns="" val="1"/>
             </a:ext>
           </a:extLst>
         </p:spPr>
@@ -1662,14 +1663,14 @@
           <a:noFill/>
           <a:extLst>
             <a:ext uri="{909E8E84-426E-40DD-AFC4-6F175D3DCCD1}">
-              <a14:hiddenFill xmlns:a14="http://schemas.microsoft.com/office/drawing/2010/main">
+              <a14:hiddenFill xmlns:a14="http://schemas.microsoft.com/office/drawing/2010/main" xmlns="">
                 <a:solidFill>
                   <a:srgbClr val="FFFFFF"/>
                 </a:solidFill>
               </a14:hiddenFill>
             </a:ext>
             <a:ext uri="{91240B29-F687-4F45-9708-019B960494DF}">
-              <a14:hiddenLine xmlns:a14="http://schemas.microsoft.com/office/drawing/2010/main" w="9525">
+              <a14:hiddenLine xmlns:a14="http://schemas.microsoft.com/office/drawing/2010/main" xmlns="" w="9525">
                 <a:solidFill>
                   <a:srgbClr val="000000"/>
                 </a:solidFill>
@@ -1679,7 +1680,7 @@
               </a14:hiddenLine>
             </a:ext>
             <a:ext uri="{FAA26D3D-D897-4be2-8F04-BA451C77F1D7}">
-              <ma14:placeholderFlag xmlns="" xmlns:ma14="http://schemas.microsoft.com/office/mac/drawingml/2011/main" val="1"/>
+              <ma14:placeholderFlag xmlns:ma14="http://schemas.microsoft.com/office/mac/drawingml/2011/main" xmlns="" val="1"/>
             </a:ext>
           </a:extLst>
         </p:spPr>
@@ -1747,14 +1748,14 @@
           <a:noFill/>
           <a:extLst>
             <a:ext uri="{909E8E84-426E-40DD-AFC4-6F175D3DCCD1}">
-              <a14:hiddenFill xmlns:a14="http://schemas.microsoft.com/office/drawing/2010/main">
+              <a14:hiddenFill xmlns:a14="http://schemas.microsoft.com/office/drawing/2010/main" xmlns="">
                 <a:solidFill>
                   <a:srgbClr val="FFFFFF"/>
                 </a:solidFill>
               </a14:hiddenFill>
             </a:ext>
             <a:ext uri="{91240B29-F687-4F45-9708-019B960494DF}">
-              <a14:hiddenLine xmlns:a14="http://schemas.microsoft.com/office/drawing/2010/main" w="9525">
+              <a14:hiddenLine xmlns:a14="http://schemas.microsoft.com/office/drawing/2010/main" xmlns="" w="9525">
                 <a:solidFill>
                   <a:srgbClr val="000000"/>
                 </a:solidFill>
@@ -1893,7 +1894,7 @@
     </p:spTree>
     <p:extLst>
       <p:ext uri="{BB962C8B-B14F-4D97-AF65-F5344CB8AC3E}">
-        <p14:creationId xmlns:p14="http://schemas.microsoft.com/office/powerpoint/2010/main" val="3664592407"/>
+        <p14:creationId xmlns:p14="http://schemas.microsoft.com/office/powerpoint/2010/main" xmlns="" val="3664592407"/>
       </p:ext>
     </p:extLst>
   </p:cSld>
@@ -1946,14 +1947,14 @@
           </a:ln>
           <a:extLst>
             <a:ext uri="{909E8E84-426E-40DD-AFC4-6F175D3DCCD1}">
-              <a14:hiddenFill xmlns:a14="http://schemas.microsoft.com/office/drawing/2010/main">
+              <a14:hiddenFill xmlns:a14="http://schemas.microsoft.com/office/drawing/2010/main" xmlns="">
                 <a:solidFill>
                   <a:srgbClr val="FFFFFF"/>
                 </a:solidFill>
               </a14:hiddenFill>
             </a:ext>
             <a:ext uri="{FAA26D3D-D897-4be2-8F04-BA451C77F1D7}">
-              <ma14:placeholderFlag xmlns="" xmlns:ma14="http://schemas.microsoft.com/office/mac/drawingml/2011/main" val="1"/>
+              <ma14:placeholderFlag xmlns:ma14="http://schemas.microsoft.com/office/mac/drawingml/2011/main" xmlns="" val="1"/>
             </a:ext>
           </a:extLst>
         </p:spPr>
@@ -1972,14 +1973,14 @@
           <a:noFill/>
           <a:extLst>
             <a:ext uri="{909E8E84-426E-40DD-AFC4-6F175D3DCCD1}">
-              <a14:hiddenFill xmlns:a14="http://schemas.microsoft.com/office/drawing/2010/main">
+              <a14:hiddenFill xmlns:a14="http://schemas.microsoft.com/office/drawing/2010/main" xmlns="">
                 <a:solidFill>
                   <a:srgbClr val="FFFFFF"/>
                 </a:solidFill>
               </a14:hiddenFill>
             </a:ext>
             <a:ext uri="{91240B29-F687-4F45-9708-019B960494DF}">
-              <a14:hiddenLine xmlns:a14="http://schemas.microsoft.com/office/drawing/2010/main" w="9525">
+              <a14:hiddenLine xmlns:a14="http://schemas.microsoft.com/office/drawing/2010/main" xmlns="" w="9525">
                 <a:solidFill>
                   <a:srgbClr val="000000"/>
                 </a:solidFill>
@@ -1989,7 +1990,7 @@
               </a14:hiddenLine>
             </a:ext>
             <a:ext uri="{FAA26D3D-D897-4be2-8F04-BA451C77F1D7}">
-              <ma14:placeholderFlag xmlns="" xmlns:ma14="http://schemas.microsoft.com/office/mac/drawingml/2011/main" val="1"/>
+              <ma14:placeholderFlag xmlns:ma14="http://schemas.microsoft.com/office/mac/drawingml/2011/main" xmlns="" val="1"/>
             </a:ext>
           </a:extLst>
         </p:spPr>
@@ -2057,14 +2058,14 @@
           <a:noFill/>
           <a:extLst>
             <a:ext uri="{909E8E84-426E-40DD-AFC4-6F175D3DCCD1}">
-              <a14:hiddenFill xmlns:a14="http://schemas.microsoft.com/office/drawing/2010/main">
+              <a14:hiddenFill xmlns:a14="http://schemas.microsoft.com/office/drawing/2010/main" xmlns="">
                 <a:solidFill>
                   <a:srgbClr val="FFFFFF"/>
                 </a:solidFill>
               </a14:hiddenFill>
             </a:ext>
             <a:ext uri="{91240B29-F687-4F45-9708-019B960494DF}">
-              <a14:hiddenLine xmlns:a14="http://schemas.microsoft.com/office/drawing/2010/main" w="9525">
+              <a14:hiddenLine xmlns:a14="http://schemas.microsoft.com/office/drawing/2010/main" xmlns="" w="9525">
                 <a:solidFill>
                   <a:srgbClr val="000000"/>
                 </a:solidFill>
@@ -2203,7 +2204,317 @@
     </p:spTree>
     <p:extLst>
       <p:ext uri="{BB962C8B-B14F-4D97-AF65-F5344CB8AC3E}">
-        <p14:creationId xmlns:p14="http://schemas.microsoft.com/office/powerpoint/2010/main" val="2844701957"/>
+        <p14:creationId xmlns:p14="http://schemas.microsoft.com/office/powerpoint/2010/main" xmlns="" val="2844701957"/>
+      </p:ext>
+    </p:extLst>
+  </p:cSld>
+  <p:clrMapOvr>
+    <a:masterClrMapping/>
+  </p:clrMapOvr>
+</p:notes>
+</file>
+
+<file path=ppt/notesSlides/notesSlide5.xml><?xml version="1.0" encoding="utf-8"?>
+<p:notes xmlns:a="http://schemas.openxmlformats.org/drawingml/2006/main" xmlns:r="http://schemas.openxmlformats.org/officeDocument/2006/relationships" xmlns:p="http://schemas.openxmlformats.org/presentationml/2006/main">
+  <p:cSld>
+    <p:spTree>
+      <p:nvGrpSpPr>
+        <p:cNvPr id="1" name=""/>
+        <p:cNvGrpSpPr/>
+        <p:nvPr/>
+      </p:nvGrpSpPr>
+      <p:grpSpPr>
+        <a:xfrm>
+          <a:off x="0" y="0"/>
+          <a:ext cx="0" cy="0"/>
+          <a:chOff x="0" y="0"/>
+          <a:chExt cx="0" cy="0"/>
+        </a:xfrm>
+      </p:grpSpPr>
+      <p:sp>
+        <p:nvSpPr>
+          <p:cNvPr id="25601" name="Slide Image Placeholder 1"/>
+          <p:cNvSpPr>
+            <a:spLocks noGrp="1" noRot="1" noChangeAspect="1"/>
+          </p:cNvSpPr>
+          <p:nvPr>
+            <p:ph type="sldImg"/>
+          </p:nvPr>
+        </p:nvSpPr>
+        <p:spPr bwMode="auto">
+          <a:xfrm>
+            <a:off x="381000" y="685800"/>
+            <a:ext cx="6096000" cy="3429000"/>
+          </a:xfrm>
+          <a:noFill/>
+          <a:ln>
+            <a:solidFill>
+              <a:srgbClr val="000000"/>
+            </a:solidFill>
+            <a:miter lim="800000"/>
+            <a:headEnd/>
+            <a:tailEnd/>
+          </a:ln>
+          <a:extLst>
+            <a:ext uri="{909E8E84-426E-40DD-AFC4-6F175D3DCCD1}">
+              <a14:hiddenFill xmlns:a14="http://schemas.microsoft.com/office/drawing/2010/main" xmlns="">
+                <a:solidFill>
+                  <a:srgbClr val="FFFFFF"/>
+                </a:solidFill>
+              </a14:hiddenFill>
+            </a:ext>
+            <a:ext uri="{FAA26D3D-D897-4be2-8F04-BA451C77F1D7}">
+              <ma14:placeholderFlag xmlns:ma14="http://schemas.microsoft.com/office/mac/drawingml/2011/main" xmlns="" val="1"/>
+            </a:ext>
+          </a:extLst>
+        </p:spPr>
+      </p:sp>
+      <p:sp>
+        <p:nvSpPr>
+          <p:cNvPr id="25602" name="Notes Placeholder 2"/>
+          <p:cNvSpPr>
+            <a:spLocks noGrp="1"/>
+          </p:cNvSpPr>
+          <p:nvPr>
+            <p:ph type="body" idx="1"/>
+          </p:nvPr>
+        </p:nvSpPr>
+        <p:spPr bwMode="auto">
+          <a:noFill/>
+          <a:extLst>
+            <a:ext uri="{909E8E84-426E-40DD-AFC4-6F175D3DCCD1}">
+              <a14:hiddenFill xmlns:a14="http://schemas.microsoft.com/office/drawing/2010/main" xmlns="">
+                <a:solidFill>
+                  <a:srgbClr val="FFFFFF"/>
+                </a:solidFill>
+              </a14:hiddenFill>
+            </a:ext>
+            <a:ext uri="{91240B29-F687-4F45-9708-019B960494DF}">
+              <a14:hiddenLine xmlns:a14="http://schemas.microsoft.com/office/drawing/2010/main" xmlns="" w="9525">
+                <a:solidFill>
+                  <a:srgbClr val="000000"/>
+                </a:solidFill>
+                <a:miter lim="800000"/>
+                <a:headEnd/>
+                <a:tailEnd/>
+              </a14:hiddenLine>
+            </a:ext>
+            <a:ext uri="{FAA26D3D-D897-4be2-8F04-BA451C77F1D7}">
+              <ma14:placeholderFlag xmlns:ma14="http://schemas.microsoft.com/office/mac/drawingml/2011/main" xmlns="" val="1"/>
+            </a:ext>
+          </a:extLst>
+        </p:spPr>
+        <p:txBody>
+          <a:bodyPr wrap="square" numCol="1" anchor="t" anchorCtr="0" compatLnSpc="1">
+            <a:prstTxWarp prst="textNoShape">
+              <a:avLst/>
+            </a:prstTxWarp>
+          </a:bodyPr>
+          <a:lstStyle/>
+          <a:p>
+            <a:pPr marL="0" marR="0" indent="0" algn="l" defTabSz="914400" rtl="0" eaLnBrk="1" fontAlgn="base" latinLnBrk="0" hangingPunct="1">
+              <a:lnSpc>
+                <a:spcPct val="100000"/>
+              </a:lnSpc>
+              <a:spcBef>
+                <a:spcPct val="0"/>
+              </a:spcBef>
+              <a:spcAft>
+                <a:spcPct val="0"/>
+              </a:spcAft>
+              <a:buClrTx/>
+              <a:buSzTx/>
+              <a:buFontTx/>
+              <a:buNone/>
+              <a:tabLst/>
+              <a:defRPr/>
+            </a:pPr>
+            <a:r>
+              <a:rPr lang="en-US" sz="1100" kern="1200" dirty="0" smtClean="0">
+                <a:solidFill>
+                  <a:schemeClr val="tx1"/>
+                </a:solidFill>
+                <a:effectLst/>
+                <a:latin typeface="+mn-lt"/>
+                <a:ea typeface="ＭＳ Ｐゴシック" charset="0"/>
+                <a:cs typeface="ＭＳ Ｐゴシック" charset="0"/>
+              </a:rPr>
+              <a:t> surveyed a number of additional rendering topics including post processing, shadow mapping, skeletal animation, geometry and tessellation shaders, deferred rendering, global illumination, and compute shaders.</a:t>
+            </a:r>
+          </a:p>
+          <a:p>
+            <a:pPr eaLnBrk="1" hangingPunct="1">
+              <a:spcBef>
+                <a:spcPct val="0"/>
+              </a:spcBef>
+            </a:pPr>
+            <a:endParaRPr lang="en-US" dirty="0">
+              <a:latin typeface="Calibri" charset="0"/>
+            </a:endParaRPr>
+          </a:p>
+        </p:txBody>
+      </p:sp>
+      <p:sp>
+        <p:nvSpPr>
+          <p:cNvPr id="25603" name="Slide Number Placeholder 3"/>
+          <p:cNvSpPr>
+            <a:spLocks noGrp="1"/>
+          </p:cNvSpPr>
+          <p:nvPr>
+            <p:ph type="sldNum" sz="quarter" idx="5"/>
+          </p:nvPr>
+        </p:nvSpPr>
+        <p:spPr bwMode="auto">
+          <a:noFill/>
+          <a:extLst>
+            <a:ext uri="{909E8E84-426E-40DD-AFC4-6F175D3DCCD1}">
+              <a14:hiddenFill xmlns:a14="http://schemas.microsoft.com/office/drawing/2010/main" xmlns="">
+                <a:solidFill>
+                  <a:srgbClr val="FFFFFF"/>
+                </a:solidFill>
+              </a14:hiddenFill>
+            </a:ext>
+            <a:ext uri="{91240B29-F687-4F45-9708-019B960494DF}">
+              <a14:hiddenLine xmlns:a14="http://schemas.microsoft.com/office/drawing/2010/main" xmlns="" w="9525">
+                <a:solidFill>
+                  <a:srgbClr val="000000"/>
+                </a:solidFill>
+                <a:miter lim="800000"/>
+                <a:headEnd/>
+                <a:tailEnd/>
+              </a14:hiddenLine>
+            </a:ext>
+          </a:extLst>
+        </p:spPr>
+        <p:txBody>
+          <a:bodyPr/>
+          <a:lstStyle>
+            <a:lvl1pPr eaLnBrk="0" hangingPunct="0">
+              <a:defRPr sz="4000">
+                <a:solidFill>
+                  <a:schemeClr val="tx1"/>
+                </a:solidFill>
+                <a:latin typeface="Arial" charset="0"/>
+                <a:ea typeface="ＭＳ Ｐゴシック" charset="0"/>
+                <a:cs typeface="ＭＳ Ｐゴシック" charset="0"/>
+              </a:defRPr>
+            </a:lvl1pPr>
+            <a:lvl2pPr marL="742950" indent="-285750" eaLnBrk="0" hangingPunct="0">
+              <a:defRPr sz="4000">
+                <a:solidFill>
+                  <a:schemeClr val="tx1"/>
+                </a:solidFill>
+                <a:latin typeface="Arial" charset="0"/>
+                <a:ea typeface="ＭＳ Ｐゴシック" charset="0"/>
+              </a:defRPr>
+            </a:lvl2pPr>
+            <a:lvl3pPr marL="1143000" indent="-228600" eaLnBrk="0" hangingPunct="0">
+              <a:defRPr sz="4000">
+                <a:solidFill>
+                  <a:schemeClr val="tx1"/>
+                </a:solidFill>
+                <a:latin typeface="Arial" charset="0"/>
+                <a:ea typeface="ＭＳ Ｐゴシック" charset="0"/>
+              </a:defRPr>
+            </a:lvl3pPr>
+            <a:lvl4pPr marL="1600200" indent="-228600" eaLnBrk="0" hangingPunct="0">
+              <a:defRPr sz="4000">
+                <a:solidFill>
+                  <a:schemeClr val="tx1"/>
+                </a:solidFill>
+                <a:latin typeface="Arial" charset="0"/>
+                <a:ea typeface="ＭＳ Ｐゴシック" charset="0"/>
+              </a:defRPr>
+            </a:lvl4pPr>
+            <a:lvl5pPr marL="2057400" indent="-228600" eaLnBrk="0" hangingPunct="0">
+              <a:defRPr sz="4000">
+                <a:solidFill>
+                  <a:schemeClr val="tx1"/>
+                </a:solidFill>
+                <a:latin typeface="Arial" charset="0"/>
+                <a:ea typeface="ＭＳ Ｐゴシック" charset="0"/>
+              </a:defRPr>
+            </a:lvl5pPr>
+            <a:lvl6pPr marL="2514600" indent="-228600" eaLnBrk="0" fontAlgn="base" hangingPunct="0">
+              <a:spcBef>
+                <a:spcPct val="0"/>
+              </a:spcBef>
+              <a:spcAft>
+                <a:spcPct val="0"/>
+              </a:spcAft>
+              <a:defRPr sz="4000">
+                <a:solidFill>
+                  <a:schemeClr val="tx1"/>
+                </a:solidFill>
+                <a:latin typeface="Arial" charset="0"/>
+                <a:ea typeface="ＭＳ Ｐゴシック" charset="0"/>
+              </a:defRPr>
+            </a:lvl6pPr>
+            <a:lvl7pPr marL="2971800" indent="-228600" eaLnBrk="0" fontAlgn="base" hangingPunct="0">
+              <a:spcBef>
+                <a:spcPct val="0"/>
+              </a:spcBef>
+              <a:spcAft>
+                <a:spcPct val="0"/>
+              </a:spcAft>
+              <a:defRPr sz="4000">
+                <a:solidFill>
+                  <a:schemeClr val="tx1"/>
+                </a:solidFill>
+                <a:latin typeface="Arial" charset="0"/>
+                <a:ea typeface="ＭＳ Ｐゴシック" charset="0"/>
+              </a:defRPr>
+            </a:lvl7pPr>
+            <a:lvl8pPr marL="3429000" indent="-228600" eaLnBrk="0" fontAlgn="base" hangingPunct="0">
+              <a:spcBef>
+                <a:spcPct val="0"/>
+              </a:spcBef>
+              <a:spcAft>
+                <a:spcPct val="0"/>
+              </a:spcAft>
+              <a:defRPr sz="4000">
+                <a:solidFill>
+                  <a:schemeClr val="tx1"/>
+                </a:solidFill>
+                <a:latin typeface="Arial" charset="0"/>
+                <a:ea typeface="ＭＳ Ｐゴシック" charset="0"/>
+              </a:defRPr>
+            </a:lvl8pPr>
+            <a:lvl9pPr marL="3886200" indent="-228600" eaLnBrk="0" fontAlgn="base" hangingPunct="0">
+              <a:spcBef>
+                <a:spcPct val="0"/>
+              </a:spcBef>
+              <a:spcAft>
+                <a:spcPct val="0"/>
+              </a:spcAft>
+              <a:defRPr sz="4000">
+                <a:solidFill>
+                  <a:schemeClr val="tx1"/>
+                </a:solidFill>
+                <a:latin typeface="Arial" charset="0"/>
+                <a:ea typeface="ＭＳ Ｐゴシック" charset="0"/>
+              </a:defRPr>
+            </a:lvl9pPr>
+          </a:lstStyle>
+          <a:p>
+            <a:pPr eaLnBrk="1" hangingPunct="1"/>
+            <a:fld id="{5E964B50-2C54-7E48-8B01-833EA9594D5E}" type="slidenum">
+              <a:rPr lang="en-US" sz="1200">
+                <a:latin typeface="Calibri" charset="0"/>
+              </a:rPr>
+              <a:pPr eaLnBrk="1" hangingPunct="1"/>
+              <a:t>5</a:t>
+            </a:fld>
+            <a:endParaRPr lang="en-US" sz="1200">
+              <a:latin typeface="Calibri" charset="0"/>
+            </a:endParaRPr>
+          </a:p>
+        </p:txBody>
+      </p:sp>
+    </p:spTree>
+    <p:extLst>
+      <p:ext uri="{BB962C8B-B14F-4D97-AF65-F5344CB8AC3E}">
+        <p14:creationId xmlns:p14="http://schemas.microsoft.com/office/powerpoint/2010/main" xmlns="" val="2844701957"/>
       </p:ext>
     </p:extLst>
   </p:cSld>
@@ -2219,7 +2530,7 @@
     <p:bg>
       <p:bgPr>
         <a:blipFill rotWithShape="1">
-          <a:blip r:embed="rId2"/>
+          <a:blip r:embed="rId2" cstate="print"/>
           <a:stretch>
             <a:fillRect/>
           </a:stretch>
@@ -2390,7 +2701,7 @@
     </p:spTree>
     <p:extLst>
       <p:ext uri="{BB962C8B-B14F-4D97-AF65-F5344CB8AC3E}">
-        <p14:creationId xmlns:p14="http://schemas.microsoft.com/office/powerpoint/2010/main" val="2736585531"/>
+        <p14:creationId xmlns:p14="http://schemas.microsoft.com/office/powerpoint/2010/main" xmlns="" val="2736585531"/>
       </p:ext>
     </p:extLst>
   </p:cSld>
@@ -2406,7 +2717,7 @@
     <p:bg>
       <p:bgPr>
         <a:blipFill rotWithShape="1">
-          <a:blip r:embed="rId2"/>
+          <a:blip r:embed="rId2" cstate="print"/>
           <a:stretch>
             <a:fillRect/>
           </a:stretch>
@@ -2452,7 +2763,7 @@
           </a:ln>
           <a:extLst>
             <a:ext uri="{91240B29-F687-4F45-9708-019B960494DF}">
-              <a14:hiddenLine xmlns:a14="http://schemas.microsoft.com/office/drawing/2010/main" w="9525">
+              <a14:hiddenLine xmlns:a14="http://schemas.microsoft.com/office/drawing/2010/main" xmlns="" w="9525">
                 <a:solidFill>
                   <a:srgbClr val="000000"/>
                 </a:solidFill>
@@ -2474,7 +2785,7 @@
     </p:spTree>
     <p:extLst>
       <p:ext uri="{BB962C8B-B14F-4D97-AF65-F5344CB8AC3E}">
-        <p14:creationId xmlns:p14="http://schemas.microsoft.com/office/powerpoint/2010/main" val="2983136253"/>
+        <p14:creationId xmlns:p14="http://schemas.microsoft.com/office/powerpoint/2010/main" xmlns="" val="2983136253"/>
       </p:ext>
     </p:extLst>
   </p:cSld>
@@ -2533,14 +2844,14 @@
           </a:ln>
           <a:extLst>
             <a:ext uri="{909E8E84-426E-40DD-AFC4-6F175D3DCCD1}">
-              <a14:hiddenFill xmlns:a14="http://schemas.microsoft.com/office/drawing/2010/main">
+              <a14:hiddenFill xmlns:a14="http://schemas.microsoft.com/office/drawing/2010/main" xmlns="">
                 <a:solidFill>
                   <a:srgbClr val="FFFFFF"/>
                 </a:solidFill>
               </a14:hiddenFill>
             </a:ext>
             <a:ext uri="{91240B29-F687-4F45-9708-019B960494DF}">
-              <a14:hiddenLine xmlns:a14="http://schemas.microsoft.com/office/drawing/2010/main" w="9525">
+              <a14:hiddenLine xmlns:a14="http://schemas.microsoft.com/office/drawing/2010/main" xmlns="" w="9525">
                 <a:solidFill>
                   <a:srgbClr val="000000"/>
                 </a:solidFill>
@@ -2550,7 +2861,7 @@
               </a14:hiddenLine>
             </a:ext>
             <a:ext uri="{FAA26D3D-D897-4be2-8F04-BA451C77F1D7}">
-              <ma14:placeholderFlag xmlns:ma14="http://schemas.microsoft.com/office/mac/drawingml/2011/main" xmlns="" val="1"/>
+              <ma14:placeholderFlag xmlns="" xmlns:ma14="http://schemas.microsoft.com/office/mac/drawingml/2011/main" val="1"/>
             </a:ext>
           </a:extLst>
         </p:spPr>
@@ -2595,14 +2906,14 @@
           </a:ln>
           <a:extLst>
             <a:ext uri="{909E8E84-426E-40DD-AFC4-6F175D3DCCD1}">
-              <a14:hiddenFill xmlns:a14="http://schemas.microsoft.com/office/drawing/2010/main">
+              <a14:hiddenFill xmlns:a14="http://schemas.microsoft.com/office/drawing/2010/main" xmlns="">
                 <a:solidFill>
                   <a:srgbClr val="FFFFFF"/>
                 </a:solidFill>
               </a14:hiddenFill>
             </a:ext>
             <a:ext uri="{91240B29-F687-4F45-9708-019B960494DF}">
-              <a14:hiddenLine xmlns:a14="http://schemas.microsoft.com/office/drawing/2010/main" w="9525">
+              <a14:hiddenLine xmlns:a14="http://schemas.microsoft.com/office/drawing/2010/main" xmlns="" w="9525">
                 <a:solidFill>
                   <a:srgbClr val="000000"/>
                 </a:solidFill>
@@ -2612,7 +2923,7 @@
               </a14:hiddenLine>
             </a:ext>
             <a:ext uri="{FAA26D3D-D897-4be2-8F04-BA451C77F1D7}">
-              <ma14:placeholderFlag xmlns:ma14="http://schemas.microsoft.com/office/mac/drawingml/2011/main" xmlns="" val="1"/>
+              <ma14:placeholderFlag xmlns="" xmlns:ma14="http://schemas.microsoft.com/office/mac/drawingml/2011/main" val="1"/>
             </a:ext>
           </a:extLst>
         </p:spPr>
@@ -3248,7 +3559,7 @@
           <a:blip r:embed="rId3" cstate="email">
             <a:extLst>
               <a:ext uri="{28A0092B-C50C-407E-A947-70E740481C1C}">
-                <a14:useLocalDpi xmlns:a14="http://schemas.microsoft.com/office/drawing/2010/main" val="0"/>
+                <a14:useLocalDpi xmlns:a14="http://schemas.microsoft.com/office/drawing/2010/main" xmlns="" val="0"/>
               </a:ext>
             </a:extLst>
           </a:blip>
@@ -3275,7 +3586,7 @@
           <p:nvPr/>
         </p:nvPicPr>
         <p:blipFill>
-          <a:blip r:embed="rId4"/>
+          <a:blip r:embed="rId4" cstate="print"/>
           <a:stretch>
             <a:fillRect/>
           </a:stretch>
@@ -3358,7 +3669,7 @@
     </p:spTree>
     <p:extLst>
       <p:ext uri="{BB962C8B-B14F-4D97-AF65-F5344CB8AC3E}">
-        <p14:creationId xmlns:p14="http://schemas.microsoft.com/office/powerpoint/2010/main" val="104861813"/>
+        <p14:creationId xmlns:p14="http://schemas.microsoft.com/office/powerpoint/2010/main" xmlns="" val="104861813"/>
       </p:ext>
     </p:extLst>
   </p:cSld>
@@ -3699,13 +4010,8 @@
             </a:r>
             <a:r>
               <a:rPr lang="en-US" sz="1800" dirty="0" smtClean="0"/>
-              <a:t>. </a:t>
+              <a:t>. Additional texturing by Nick Zuccarello, Florida Interactive Entertainment Academy.</a:t>
             </a:r>
-            <a:r>
-              <a:rPr lang="en-US" sz="1800" dirty="0" smtClean="0"/>
-              <a:t>Additional texturing by Nick Zuccarello, Florida Interactive Entertainment Academy.</a:t>
-            </a:r>
-            <a:endParaRPr lang="en-US" sz="1800" dirty="0" smtClean="0"/>
           </a:p>
         </p:txBody>
       </p:sp>
@@ -3718,7 +4024,7 @@
           <p:nvPr/>
         </p:nvPicPr>
         <p:blipFill>
-          <a:blip r:embed="rId3"/>
+          <a:blip r:embed="rId3" cstate="print"/>
           <a:stretch>
             <a:fillRect/>
           </a:stretch>
@@ -3742,7 +4048,7 @@
           <p:nvPr/>
         </p:nvPicPr>
         <p:blipFill>
-          <a:blip r:embed="rId4"/>
+          <a:blip r:embed="rId4" cstate="print"/>
           <a:stretch>
             <a:fillRect/>
           </a:stretch>
@@ -3760,7 +4066,7 @@
     </p:spTree>
     <p:extLst>
       <p:ext uri="{BB962C8B-B14F-4D97-AF65-F5344CB8AC3E}">
-        <p14:creationId xmlns:p14="http://schemas.microsoft.com/office/powerpoint/2010/main" val="2815046579"/>
+        <p14:creationId xmlns:p14="http://schemas.microsoft.com/office/powerpoint/2010/main" xmlns="" val="2815046579"/>
       </p:ext>
     </p:extLst>
   </p:cSld>
@@ -3988,7 +4294,7 @@
           <p:nvPr/>
         </p:nvPicPr>
         <p:blipFill>
-          <a:blip r:embed="rId3"/>
+          <a:blip r:embed="rId3" cstate="print"/>
           <a:stretch>
             <a:fillRect/>
           </a:stretch>
@@ -4003,10 +4309,92 @@
           </a:prstGeom>
         </p:spPr>
       </p:pic>
+      <p:pic>
+        <p:nvPicPr>
+          <p:cNvPr id="7" name="Picture 6"/>
+          <p:cNvPicPr>
+            <a:picLocks noChangeAspect="1"/>
+          </p:cNvPicPr>
+          <p:nvPr/>
+        </p:nvPicPr>
+        <p:blipFill>
+          <a:blip r:embed="rId4" cstate="email">
+            <a:extLst>
+              <a:ext uri="{28A0092B-C50C-407E-A947-70E740481C1C}">
+                <a14:useLocalDpi xmlns:a14="http://schemas.microsoft.com/office/drawing/2010/main" xmlns="" val="0"/>
+              </a:ext>
+            </a:extLst>
+          </a:blip>
+          <a:stretch>
+            <a:fillRect/>
+          </a:stretch>
+        </p:blipFill>
+        <p:spPr>
+          <a:xfrm>
+            <a:off x="762000" y="3105150"/>
+            <a:ext cx="2209800" cy="1243012"/>
+          </a:xfrm>
+          <a:prstGeom prst="rect">
+            <a:avLst/>
+          </a:prstGeom>
+        </p:spPr>
+      </p:pic>
+      <p:sp>
+        <p:nvSpPr>
+          <p:cNvPr id="8" name="TextBox 7"/>
+          <p:cNvSpPr txBox="1"/>
+          <p:nvPr/>
+        </p:nvSpPr>
+        <p:spPr>
+          <a:xfrm>
+            <a:off x="3124200" y="3105150"/>
+            <a:ext cx="4800600" cy="1200329"/>
+          </a:xfrm>
+          <a:prstGeom prst="rect">
+            <a:avLst/>
+          </a:prstGeom>
+          <a:noFill/>
+        </p:spPr>
+        <p:txBody>
+          <a:bodyPr wrap="square" rtlCol="0">
+            <a:spAutoFit/>
+          </a:bodyPr>
+          <a:lstStyle/>
+          <a:p>
+            <a:r>
+              <a:rPr lang="en-US" sz="1800" dirty="0" smtClean="0"/>
+              <a:t>A mnemonic for 3D coordinate system </a:t>
+            </a:r>
+            <a:r>
+              <a:rPr lang="en-US" sz="1800" dirty="0" smtClean="0"/>
+              <a:t>handedness b</a:t>
+            </a:r>
+            <a:r>
+              <a:rPr lang="en-US" sz="1800" i="1" dirty="0" smtClean="0"/>
+              <a:t>y </a:t>
+            </a:r>
+            <a:r>
+              <a:rPr lang="en-US" sz="1800" dirty="0" err="1" smtClean="0"/>
+              <a:t>Primalshell</a:t>
+            </a:r>
+            <a:r>
+              <a:rPr lang="en-US" sz="1800" dirty="0" smtClean="0"/>
+              <a:t> [CC-BY-SA-3.0</a:t>
+            </a:r>
+          </a:p>
+          <a:p>
+            <a:r>
+              <a:rPr lang="en-US" sz="1800" dirty="0" smtClean="0"/>
+              <a:t>( http://creativecommons.org/licenses/by-sa/3.0 )] via Wikimedia Commons</a:t>
+            </a:r>
+            <a:endParaRPr lang="en-US" sz="1800" dirty="0" smtClean="0"/>
+          </a:p>
+        </p:txBody>
+      </p:sp>
     </p:spTree>
     <p:extLst>
       <p:ext uri="{BB962C8B-B14F-4D97-AF65-F5344CB8AC3E}">
-        <p14:creationId xmlns:p14="http://schemas.microsoft.com/office/powerpoint/2010/main" val="124996417"/>
+        <p14:creationId xmlns:p14="http://schemas.microsoft.com/office/powerpoint/2010/main" xmlns="" val="124996417"/>
       </p:ext>
     </p:extLst>
   </p:cSld>
@@ -4050,6 +4438,374 @@
                                           <p:spTgt spid="5">
                                             <p:txEl>
                                               <p:pRg st="0" end="0"/>
+                                            </p:txEl>
+                                          </p:spTgt>
+                                        </p:tgtEl>
+                                        <p:attrNameLst>
+                                          <p:attrName>style.visibility</p:attrName>
+                                        </p:attrNameLst>
+                                      </p:cBhvr>
+                                      <p:to>
+                                        <p:strVal val="visible"/>
+                                      </p:to>
+                                    </p:set>
+                                  </p:childTnLst>
+                                </p:cTn>
+                              </p:par>
+                            </p:childTnLst>
+                          </p:cTn>
+                        </p:par>
+                      </p:childTnLst>
+                    </p:cTn>
+                  </p:par>
+                  <p:par>
+                    <p:cTn id="7" fill="hold">
+                      <p:stCondLst>
+                        <p:cond delay="indefinite"/>
+                      </p:stCondLst>
+                      <p:childTnLst>
+                        <p:par>
+                          <p:cTn id="8" fill="hold">
+                            <p:stCondLst>
+                              <p:cond delay="0"/>
+                            </p:stCondLst>
+                            <p:childTnLst>
+                              <p:par>
+                                <p:cTn id="9" presetID="1" presetClass="entr" presetSubtype="0" fill="hold" nodeType="clickEffect">
+                                  <p:stCondLst>
+                                    <p:cond delay="0"/>
+                                  </p:stCondLst>
+                                  <p:childTnLst>
+                                    <p:set>
+                                      <p:cBhvr>
+                                        <p:cTn id="10" dur="1" fill="hold">
+                                          <p:stCondLst>
+                                            <p:cond delay="0"/>
+                                          </p:stCondLst>
+                                        </p:cTn>
+                                        <p:tgtEl>
+                                          <p:spTgt spid="8">
+                                            <p:txEl>
+                                              <p:pRg st="0" end="0"/>
+                                            </p:txEl>
+                                          </p:spTgt>
+                                        </p:tgtEl>
+                                        <p:attrNameLst>
+                                          <p:attrName>style.visibility</p:attrName>
+                                        </p:attrNameLst>
+                                      </p:cBhvr>
+                                      <p:to>
+                                        <p:strVal val="visible"/>
+                                      </p:to>
+                                    </p:set>
+                                  </p:childTnLst>
+                                </p:cTn>
+                              </p:par>
+                            </p:childTnLst>
+                          </p:cTn>
+                        </p:par>
+                      </p:childTnLst>
+                    </p:cTn>
+                  </p:par>
+                  <p:par>
+                    <p:cTn id="11" fill="hold">
+                      <p:stCondLst>
+                        <p:cond delay="indefinite"/>
+                      </p:stCondLst>
+                      <p:childTnLst>
+                        <p:par>
+                          <p:cTn id="12" fill="hold">
+                            <p:stCondLst>
+                              <p:cond delay="0"/>
+                            </p:stCondLst>
+                            <p:childTnLst>
+                              <p:par>
+                                <p:cTn id="13" presetID="1" presetClass="entr" presetSubtype="0" fill="hold" nodeType="clickEffect">
+                                  <p:stCondLst>
+                                    <p:cond delay="0"/>
+                                  </p:stCondLst>
+                                  <p:childTnLst>
+                                    <p:set>
+                                      <p:cBhvr>
+                                        <p:cTn id="14" dur="1" fill="hold">
+                                          <p:stCondLst>
+                                            <p:cond delay="0"/>
+                                          </p:stCondLst>
+                                        </p:cTn>
+                                        <p:tgtEl>
+                                          <p:spTgt spid="8">
+                                            <p:txEl>
+                                              <p:pRg st="1" end="1"/>
+                                            </p:txEl>
+                                          </p:spTgt>
+                                        </p:tgtEl>
+                                        <p:attrNameLst>
+                                          <p:attrName>style.visibility</p:attrName>
+                                        </p:attrNameLst>
+                                      </p:cBhvr>
+                                      <p:to>
+                                        <p:strVal val="visible"/>
+                                      </p:to>
+                                    </p:set>
+                                  </p:childTnLst>
+                                </p:cTn>
+                              </p:par>
+                            </p:childTnLst>
+                          </p:cTn>
+                        </p:par>
+                      </p:childTnLst>
+                    </p:cTn>
+                  </p:par>
+                </p:childTnLst>
+              </p:cTn>
+              <p:prevCondLst>
+                <p:cond evt="onPrev" delay="0">
+                  <p:tgtEl>
+                    <p:sldTgt/>
+                  </p:tgtEl>
+                </p:cond>
+              </p:prevCondLst>
+              <p:nextCondLst>
+                <p:cond evt="onNext" delay="0">
+                  <p:tgtEl>
+                    <p:sldTgt/>
+                  </p:tgtEl>
+                </p:cond>
+              </p:nextCondLst>
+            </p:seq>
+          </p:childTnLst>
+        </p:cTn>
+      </p:par>
+    </p:tnLst>
+  </p:timing>
+</p:sld>
+</file>
+
+<file path=ppt/slides/slide5.xml><?xml version="1.0" encoding="utf-8"?>
+<p:sld xmlns:a="http://schemas.openxmlformats.org/drawingml/2006/main" xmlns:r="http://schemas.openxmlformats.org/officeDocument/2006/relationships" xmlns:p="http://schemas.openxmlformats.org/presentationml/2006/main">
+  <p:cSld>
+    <p:spTree>
+      <p:nvGrpSpPr>
+        <p:cNvPr id="1" name=""/>
+        <p:cNvGrpSpPr/>
+        <p:nvPr/>
+      </p:nvGrpSpPr>
+      <p:grpSpPr>
+        <a:xfrm>
+          <a:off x="0" y="0"/>
+          <a:ext cx="0" cy="0"/>
+          <a:chOff x="0" y="0"/>
+          <a:chExt cx="0" cy="0"/>
+        </a:xfrm>
+      </p:grpSpPr>
+      <p:sp>
+        <p:nvSpPr>
+          <p:cNvPr id="4" name="TextBox 3"/>
+          <p:cNvSpPr txBox="1"/>
+          <p:nvPr/>
+        </p:nvSpPr>
+        <p:spPr>
+          <a:xfrm>
+            <a:off x="709670" y="392241"/>
+            <a:ext cx="2424062" cy="523220"/>
+          </a:xfrm>
+          <a:prstGeom prst="rect">
+            <a:avLst/>
+          </a:prstGeom>
+          <a:noFill/>
+        </p:spPr>
+        <p:txBody>
+          <a:bodyPr wrap="none" rtlCol="0">
+            <a:spAutoFit/>
+          </a:bodyPr>
+          <a:lstStyle/>
+          <a:p>
+            <a:r>
+              <a:rPr lang="en-US" sz="2800" dirty="0" smtClean="0"/>
+              <a:t>Image Credits</a:t>
+            </a:r>
+            <a:endParaRPr lang="en-US" sz="2800" dirty="0"/>
+          </a:p>
+        </p:txBody>
+      </p:sp>
+      <p:sp>
+        <p:nvSpPr>
+          <p:cNvPr id="5" name="TextBox 4"/>
+          <p:cNvSpPr txBox="1"/>
+          <p:nvPr/>
+        </p:nvSpPr>
+        <p:spPr>
+          <a:xfrm>
+            <a:off x="2972965" y="1125200"/>
+            <a:ext cx="4800600" cy="1477328"/>
+          </a:xfrm>
+          <a:prstGeom prst="rect">
+            <a:avLst/>
+          </a:prstGeom>
+          <a:noFill/>
+        </p:spPr>
+        <p:txBody>
+          <a:bodyPr wrap="square" rtlCol="0">
+            <a:spAutoFit/>
+          </a:bodyPr>
+          <a:lstStyle/>
+          <a:p>
+            <a:r>
+              <a:rPr lang="en-US" sz="1800" dirty="0" smtClean="0"/>
+              <a:t>Matrix </a:t>
+            </a:r>
+            <a:r>
+              <a:rPr lang="en-US" sz="1800" dirty="0" smtClean="0"/>
+              <a:t>multiplication by </a:t>
+            </a:r>
+            <a:r>
+              <a:rPr lang="en-US" sz="1800" dirty="0" err="1" smtClean="0"/>
+              <a:t>Bilou</a:t>
+            </a:r>
+            <a:r>
+              <a:rPr lang="en-US" sz="1800" dirty="0" smtClean="0"/>
+              <a:t> [GFDL ( http://www.gnu.org/copyleft/fdl.html ),</a:t>
+            </a:r>
+          </a:p>
+          <a:p>
+            <a:r>
+              <a:rPr lang="en-US" sz="1800" dirty="0" smtClean="0"/>
+              <a:t>CC-BY-SA-3.0 ( http://creativecommons.org/licenses/by-sa/3.0/ )], via Wikimedia Commons</a:t>
+            </a:r>
+            <a:r>
+              <a:rPr lang="en-US" sz="1800" dirty="0" smtClean="0"/>
+              <a:t>.</a:t>
+            </a:r>
+            <a:endParaRPr lang="en-US" sz="1800" dirty="0" smtClean="0"/>
+          </a:p>
+        </p:txBody>
+      </p:sp>
+      <p:pic>
+        <p:nvPicPr>
+          <p:cNvPr id="10" name="Picture 9"/>
+          <p:cNvPicPr>
+            <a:picLocks noChangeAspect="1"/>
+          </p:cNvPicPr>
+          <p:nvPr/>
+        </p:nvPicPr>
+        <p:blipFill>
+          <a:blip r:embed="rId3" cstate="email">
+            <a:extLst>
+              <a:ext uri="{28A0092B-C50C-407E-A947-70E740481C1C}">
+                <a14:useLocalDpi xmlns:a14="http://schemas.microsoft.com/office/drawing/2010/main" xmlns="" val="0"/>
+              </a:ext>
+            </a:extLst>
+          </a:blip>
+          <a:stretch>
+            <a:fillRect/>
+          </a:stretch>
+        </p:blipFill>
+        <p:spPr>
+          <a:xfrm>
+            <a:off x="640393" y="1047750"/>
+            <a:ext cx="2255207" cy="1981200"/>
+          </a:xfrm>
+          <a:prstGeom prst="rect">
+            <a:avLst/>
+          </a:prstGeom>
+        </p:spPr>
+      </p:pic>
+    </p:spTree>
+    <p:extLst>
+      <p:ext uri="{BB962C8B-B14F-4D97-AF65-F5344CB8AC3E}">
+        <p14:creationId xmlns:p14="http://schemas.microsoft.com/office/powerpoint/2010/main" xmlns="" val="124996417"/>
+      </p:ext>
+    </p:extLst>
+  </p:cSld>
+  <p:clrMapOvr>
+    <a:masterClrMapping/>
+  </p:clrMapOvr>
+  <p:timing>
+    <p:tnLst>
+      <p:par>
+        <p:cTn id="1" dur="indefinite" restart="never" nodeType="tmRoot">
+          <p:childTnLst>
+            <p:seq concurrent="1" nextAc="seek">
+              <p:cTn id="2" dur="indefinite" nodeType="mainSeq">
+                <p:childTnLst>
+                  <p:par>
+                    <p:cTn id="3" fill="hold">
+                      <p:stCondLst>
+                        <p:cond delay="indefinite"/>
+                      </p:stCondLst>
+                      <p:childTnLst>
+                        <p:par>
+                          <p:cTn id="4" fill="hold">
+                            <p:stCondLst>
+                              <p:cond delay="0"/>
+                            </p:stCondLst>
+                            <p:childTnLst>
+                              <p:par>
+                                <p:cTn id="5" presetID="1" presetClass="entr" presetSubtype="0" fill="hold" nodeType="clickEffect">
+                                  <p:stCondLst>
+                                    <p:cond delay="0"/>
+                                  </p:stCondLst>
+                                  <p:childTnLst>
+                                    <p:set>
+                                      <p:cBhvr>
+                                        <p:cTn id="6" dur="1" fill="hold">
+                                          <p:stCondLst>
+                                            <p:cond delay="0"/>
+                                          </p:stCondLst>
+                                        </p:cTn>
+                                        <p:tgtEl>
+                                          <p:spTgt spid="5">
+                                            <p:txEl>
+                                              <p:pRg st="0" end="0"/>
+                                            </p:txEl>
+                                          </p:spTgt>
+                                        </p:tgtEl>
+                                        <p:attrNameLst>
+                                          <p:attrName>style.visibility</p:attrName>
+                                        </p:attrNameLst>
+                                      </p:cBhvr>
+                                      <p:to>
+                                        <p:strVal val="visible"/>
+                                      </p:to>
+                                    </p:set>
+                                  </p:childTnLst>
+                                </p:cTn>
+                              </p:par>
+                            </p:childTnLst>
+                          </p:cTn>
+                        </p:par>
+                      </p:childTnLst>
+                    </p:cTn>
+                  </p:par>
+                  <p:par>
+                    <p:cTn id="7" fill="hold">
+                      <p:stCondLst>
+                        <p:cond delay="indefinite"/>
+                      </p:stCondLst>
+                      <p:childTnLst>
+                        <p:par>
+                          <p:cTn id="8" fill="hold">
+                            <p:stCondLst>
+                              <p:cond delay="0"/>
+                            </p:stCondLst>
+                            <p:childTnLst>
+                              <p:par>
+                                <p:cTn id="9" presetID="1" presetClass="entr" presetSubtype="0" fill="hold" nodeType="clickEffect">
+                                  <p:stCondLst>
+                                    <p:cond delay="0"/>
+                                  </p:stCondLst>
+                                  <p:childTnLst>
+                                    <p:set>
+                                      <p:cBhvr>
+                                        <p:cTn id="10" dur="1" fill="hold">
+                                          <p:stCondLst>
+                                            <p:cond delay="0"/>
+                                          </p:stCondLst>
+                                        </p:cTn>
+                                        <p:tgtEl>
+                                          <p:spTgt spid="5">
+                                            <p:txEl>
+                                              <p:pRg st="1" end="1"/>
                                             </p:txEl>
                                           </p:spTgt>
                                         </p:tgtEl>

</xml_diff>